<commit_message>
write memo-box css in the favorite section
</commit_message>
<xml_diff>
--- a/タカラーンの基地 新UI.pptx
+++ b/タカラーンの基地 新UI.pptx
@@ -138,7 +138,7 @@
   <pc:docChgLst>
     <pc:chgData name="takara2314 TK" userId="9da753114fb91313" providerId="LiveId" clId="{0D590E9E-C65D-4E00-AD6E-AD6BB7C4318A}"/>
     <pc:docChg chg="modSld">
-      <pc:chgData name="takara2314 TK" userId="9da753114fb91313" providerId="LiveId" clId="{0D590E9E-C65D-4E00-AD6E-AD6BB7C4318A}" dt="2020-06-21T03:17:30.246" v="7" actId="1037"/>
+      <pc:chgData name="takara2314 TK" userId="9da753114fb91313" providerId="LiveId" clId="{0D590E9E-C65D-4E00-AD6E-AD6BB7C4318A}" dt="2020-06-25T14:20:34.866" v="8" actId="208"/>
       <pc:docMkLst>
         <pc:docMk/>
       </pc:docMkLst>
@@ -156,6 +156,21 @@
             <ac:picMk id="32" creationId="{0D1BC36A-325E-426D-9F67-86E0760A55CF}"/>
           </ac:picMkLst>
         </pc:picChg>
+      </pc:sldChg>
+      <pc:sldChg chg="modSp">
+        <pc:chgData name="takara2314 TK" userId="9da753114fb91313" providerId="LiveId" clId="{0D590E9E-C65D-4E00-AD6E-AD6BB7C4318A}" dt="2020-06-25T14:20:34.866" v="8" actId="208"/>
+        <pc:sldMkLst>
+          <pc:docMk/>
+          <pc:sldMk cId="3896390280" sldId="261"/>
+        </pc:sldMkLst>
+        <pc:spChg chg="mod">
+          <ac:chgData name="takara2314 TK" userId="9da753114fb91313" providerId="LiveId" clId="{0D590E9E-C65D-4E00-AD6E-AD6BB7C4318A}" dt="2020-06-25T14:20:34.866" v="8" actId="208"/>
+          <ac:spMkLst>
+            <pc:docMk/>
+            <pc:sldMk cId="3896390280" sldId="261"/>
+            <ac:spMk id="9" creationId="{05A3C300-86CA-4E40-9F97-058B51978EC2}"/>
+          </ac:spMkLst>
+        </pc:spChg>
       </pc:sldChg>
       <pc:sldChg chg="modSp">
         <pc:chgData name="takara2314 TK" userId="9da753114fb91313" providerId="LiveId" clId="{0D590E9E-C65D-4E00-AD6E-AD6BB7C4318A}" dt="2020-06-18T13:53:39.115" v="4" actId="14861"/>
@@ -319,7 +334,7 @@
           <a:p>
             <a:fld id="{FBB64CF6-9BBC-4D17-BD62-270488F87366}" type="datetimeFigureOut">
               <a:rPr kumimoji="1" lang="ja-JP" altLang="en-US" smtClean="0"/>
-              <a:t>2020/6/20</a:t>
+              <a:t>2020/6/25</a:t>
             </a:fld>
             <a:endParaRPr kumimoji="1" lang="ja-JP" altLang="en-US"/>
           </a:p>
@@ -765,7 +780,7 @@
           <a:p>
             <a:fld id="{651F9EEE-66B7-4A9E-A8FF-6204E299CD0D}" type="datetimeFigureOut">
               <a:rPr kumimoji="1" lang="ja-JP" altLang="en-US" smtClean="0"/>
-              <a:t>2020/6/20</a:t>
+              <a:t>2020/6/25</a:t>
             </a:fld>
             <a:endParaRPr kumimoji="1" lang="ja-JP" altLang="en-US"/>
           </a:p>
@@ -995,7 +1010,7 @@
           <a:p>
             <a:fld id="{651F9EEE-66B7-4A9E-A8FF-6204E299CD0D}" type="datetimeFigureOut">
               <a:rPr kumimoji="1" lang="ja-JP" altLang="en-US" smtClean="0"/>
-              <a:t>2020/6/20</a:t>
+              <a:t>2020/6/25</a:t>
             </a:fld>
             <a:endParaRPr kumimoji="1" lang="ja-JP" altLang="en-US"/>
           </a:p>
@@ -1235,7 +1250,7 @@
           <a:p>
             <a:fld id="{651F9EEE-66B7-4A9E-A8FF-6204E299CD0D}" type="datetimeFigureOut">
               <a:rPr kumimoji="1" lang="ja-JP" altLang="en-US" smtClean="0"/>
-              <a:t>2020/6/20</a:t>
+              <a:t>2020/6/25</a:t>
             </a:fld>
             <a:endParaRPr kumimoji="1" lang="ja-JP" altLang="en-US"/>
           </a:p>
@@ -1465,7 +1480,7 @@
           <a:p>
             <a:fld id="{651F9EEE-66B7-4A9E-A8FF-6204E299CD0D}" type="datetimeFigureOut">
               <a:rPr kumimoji="1" lang="ja-JP" altLang="en-US" smtClean="0"/>
-              <a:t>2020/6/20</a:t>
+              <a:t>2020/6/25</a:t>
             </a:fld>
             <a:endParaRPr kumimoji="1" lang="ja-JP" altLang="en-US"/>
           </a:p>
@@ -1740,7 +1755,7 @@
           <a:p>
             <a:fld id="{651F9EEE-66B7-4A9E-A8FF-6204E299CD0D}" type="datetimeFigureOut">
               <a:rPr kumimoji="1" lang="ja-JP" altLang="en-US" smtClean="0"/>
-              <a:t>2020/6/20</a:t>
+              <a:t>2020/6/25</a:t>
             </a:fld>
             <a:endParaRPr kumimoji="1" lang="ja-JP" altLang="en-US"/>
           </a:p>
@@ -2069,7 +2084,7 @@
           <a:p>
             <a:fld id="{651F9EEE-66B7-4A9E-A8FF-6204E299CD0D}" type="datetimeFigureOut">
               <a:rPr kumimoji="1" lang="ja-JP" altLang="en-US" smtClean="0"/>
-              <a:t>2020/6/20</a:t>
+              <a:t>2020/6/25</a:t>
             </a:fld>
             <a:endParaRPr kumimoji="1" lang="ja-JP" altLang="en-US"/>
           </a:p>
@@ -2545,7 +2560,7 @@
           <a:p>
             <a:fld id="{651F9EEE-66B7-4A9E-A8FF-6204E299CD0D}" type="datetimeFigureOut">
               <a:rPr kumimoji="1" lang="ja-JP" altLang="en-US" smtClean="0"/>
-              <a:t>2020/6/20</a:t>
+              <a:t>2020/6/25</a:t>
             </a:fld>
             <a:endParaRPr kumimoji="1" lang="ja-JP" altLang="en-US"/>
           </a:p>
@@ -2686,7 +2701,7 @@
           <a:p>
             <a:fld id="{651F9EEE-66B7-4A9E-A8FF-6204E299CD0D}" type="datetimeFigureOut">
               <a:rPr kumimoji="1" lang="ja-JP" altLang="en-US" smtClean="0"/>
-              <a:t>2020/6/20</a:t>
+              <a:t>2020/6/25</a:t>
             </a:fld>
             <a:endParaRPr kumimoji="1" lang="ja-JP" altLang="en-US"/>
           </a:p>
@@ -2799,7 +2814,7 @@
           <a:p>
             <a:fld id="{651F9EEE-66B7-4A9E-A8FF-6204E299CD0D}" type="datetimeFigureOut">
               <a:rPr kumimoji="1" lang="ja-JP" altLang="en-US" smtClean="0"/>
-              <a:t>2020/6/20</a:t>
+              <a:t>2020/6/25</a:t>
             </a:fld>
             <a:endParaRPr kumimoji="1" lang="ja-JP" altLang="en-US"/>
           </a:p>
@@ -3142,7 +3157,7 @@
           <a:p>
             <a:fld id="{651F9EEE-66B7-4A9E-A8FF-6204E299CD0D}" type="datetimeFigureOut">
               <a:rPr kumimoji="1" lang="ja-JP" altLang="en-US" smtClean="0"/>
-              <a:t>2020/6/20</a:t>
+              <a:t>2020/6/25</a:t>
             </a:fld>
             <a:endParaRPr kumimoji="1" lang="ja-JP" altLang="en-US"/>
           </a:p>
@@ -3430,7 +3445,7 @@
           <a:p>
             <a:fld id="{651F9EEE-66B7-4A9E-A8FF-6204E299CD0D}" type="datetimeFigureOut">
               <a:rPr kumimoji="1" lang="ja-JP" altLang="en-US" smtClean="0"/>
-              <a:t>2020/6/20</a:t>
+              <a:t>2020/6/25</a:t>
             </a:fld>
             <a:endParaRPr kumimoji="1" lang="ja-JP" altLang="en-US"/>
           </a:p>
@@ -3703,7 +3718,7 @@
           <a:p>
             <a:fld id="{651F9EEE-66B7-4A9E-A8FF-6204E299CD0D}" type="datetimeFigureOut">
               <a:rPr kumimoji="1" lang="ja-JP" altLang="en-US" smtClean="0"/>
-              <a:t>2020/6/20</a:t>
+              <a:t>2020/6/25</a:t>
             </a:fld>
             <a:endParaRPr kumimoji="1" lang="ja-JP" altLang="en-US"/>
           </a:p>
@@ -9482,7 +9497,9 @@
             <a:srgbClr val="2B8DF9"/>
           </a:solidFill>
           <a:ln>
-            <a:noFill/>
+            <a:solidFill>
+              <a:srgbClr val="2B8DF9"/>
+            </a:solidFill>
           </a:ln>
         </p:spPr>
         <p:style>

</xml_diff>